<commit_message>
Subbash edits on my com
</commit_message>
<xml_diff>
--- a/docs/diagrams/powerpoint/Dev Guide Diagrams - Yida.pptx
+++ b/docs/diagrams/powerpoint/Dev Guide Diagrams - Yida.pptx
@@ -5,7 +5,7 @@
     <p:sldMasterId id="2147483761" r:id="rId1"/>
   </p:sldMasterIdLst>
   <p:notesMasterIdLst>
-    <p:notesMasterId r:id="rId13"/>
+    <p:notesMasterId r:id="rId14"/>
   </p:notesMasterIdLst>
   <p:sldIdLst>
     <p:sldId id="256" r:id="rId2"/>
@@ -19,6 +19,7 @@
     <p:sldId id="263" r:id="rId10"/>
     <p:sldId id="265" r:id="rId11"/>
     <p:sldId id="266" r:id="rId12"/>
+    <p:sldId id="267" r:id="rId13"/>
   </p:sldIdLst>
   <p:sldSz cx="12192000" cy="6858000"/>
   <p:notesSz cx="6858000" cy="9144000"/>
@@ -7523,6 +7524,125 @@
 </p:sld>
 </file>
 
+<file path=ppt/slides/slide12.xml><?xml version="1.0" encoding="utf-8"?>
+<p:sld xmlns:a="http://schemas.openxmlformats.org/drawingml/2006/main" xmlns:r="http://schemas.openxmlformats.org/officeDocument/2006/relationships" xmlns:p="http://schemas.openxmlformats.org/presentationml/2006/main">
+  <p:cSld>
+    <p:spTree>
+      <p:nvGrpSpPr>
+        <p:cNvPr id="1" name=""/>
+        <p:cNvGrpSpPr/>
+        <p:nvPr/>
+      </p:nvGrpSpPr>
+      <p:grpSpPr>
+        <a:xfrm>
+          <a:off x="0" y="0"/>
+          <a:ext cx="0" cy="0"/>
+          <a:chOff x="0" y="0"/>
+          <a:chExt cx="0" cy="0"/>
+        </a:xfrm>
+      </p:grpSpPr>
+      <p:sp>
+        <p:nvSpPr>
+          <p:cNvPr id="2" name="Title 1">
+            <a:extLst>
+              <a:ext uri="{FF2B5EF4-FFF2-40B4-BE49-F238E27FC236}">
+                <a16:creationId xmlns:a16="http://schemas.microsoft.com/office/drawing/2014/main" id="{769AEC27-5AE5-480D-8BEB-B7CF477C9BBB}"/>
+              </a:ext>
+            </a:extLst>
+          </p:cNvPr>
+          <p:cNvSpPr>
+            <a:spLocks noGrp="1"/>
+          </p:cNvSpPr>
+          <p:nvPr>
+            <p:ph type="title"/>
+          </p:nvPr>
+        </p:nvSpPr>
+        <p:spPr/>
+        <p:txBody>
+          <a:bodyPr/>
+          <a:lstStyle/>
+          <a:p>
+            <a:endParaRPr lang="en-SG"/>
+          </a:p>
+        </p:txBody>
+      </p:sp>
+      <p:sp>
+        <p:nvSpPr>
+          <p:cNvPr id="3" name="Content Placeholder 2">
+            <a:extLst>
+              <a:ext uri="{FF2B5EF4-FFF2-40B4-BE49-F238E27FC236}">
+                <a16:creationId xmlns:a16="http://schemas.microsoft.com/office/drawing/2014/main" id="{44003B67-4DF0-4775-BADD-214C33C11285}"/>
+              </a:ext>
+            </a:extLst>
+          </p:cNvPr>
+          <p:cNvSpPr>
+            <a:spLocks noGrp="1"/>
+          </p:cNvSpPr>
+          <p:nvPr>
+            <p:ph idx="1"/>
+          </p:nvPr>
+        </p:nvSpPr>
+        <p:spPr/>
+        <p:txBody>
+          <a:bodyPr/>
+          <a:lstStyle/>
+          <a:p>
+            <a:endParaRPr lang="en-SG"/>
+          </a:p>
+        </p:txBody>
+      </p:sp>
+      <p:pic>
+        <p:nvPicPr>
+          <p:cNvPr id="4" name="Picture 3">
+            <a:extLst>
+              <a:ext uri="{FF2B5EF4-FFF2-40B4-BE49-F238E27FC236}">
+                <a16:creationId xmlns:a16="http://schemas.microsoft.com/office/drawing/2014/main" id="{3A5F3554-B1EF-4F4C-8574-AEFAA1801245}"/>
+              </a:ext>
+            </a:extLst>
+          </p:cNvPr>
+          <p:cNvPicPr>
+            <a:picLocks noChangeAspect="1"/>
+          </p:cNvPicPr>
+          <p:nvPr/>
+        </p:nvPicPr>
+        <p:blipFill rotWithShape="1">
+          <a:blip r:embed="rId2"/>
+          <a:srcRect b="5292"/>
+          <a:stretch/>
+        </p:blipFill>
+        <p:spPr>
+          <a:xfrm>
+            <a:off x="914400" y="395925"/>
+            <a:ext cx="10050880" cy="5354425"/>
+          </a:xfrm>
+          <a:prstGeom prst="rect">
+            <a:avLst/>
+          </a:prstGeom>
+          <a:ln>
+            <a:noFill/>
+          </a:ln>
+          <a:effectLst>
+            <a:outerShdw blurRad="190500" algn="tl" rotWithShape="0">
+              <a:srgbClr val="000000">
+                <a:alpha val="70000"/>
+              </a:srgbClr>
+            </a:outerShdw>
+          </a:effectLst>
+        </p:spPr>
+      </p:pic>
+    </p:spTree>
+    <p:extLst>
+      <p:ext uri="{BB962C8B-B14F-4D97-AF65-F5344CB8AC3E}">
+        <p14:creationId xmlns:p14="http://schemas.microsoft.com/office/powerpoint/2010/main" val="1491082294"/>
+      </p:ext>
+    </p:extLst>
+  </p:cSld>
+  <p:clrMapOvr>
+    <a:masterClrMapping/>
+  </p:clrMapOvr>
+</p:sld>
+</file>
+
 <file path=ppt/slides/slide2.xml><?xml version="1.0" encoding="utf-8"?>
 <p:sld xmlns:a="http://schemas.openxmlformats.org/drawingml/2006/main" xmlns:r="http://schemas.openxmlformats.org/officeDocument/2006/relationships" xmlns:p="http://schemas.openxmlformats.org/presentationml/2006/main">
   <p:cSld>

</xml_diff>

<commit_message>
PPP, UG and DG edits
</commit_message>
<xml_diff>
--- a/docs/diagrams/powerpoint/Dev Guide Diagrams - Yida.pptx
+++ b/docs/diagrams/powerpoint/Dev Guide Diagrams - Yida.pptx
@@ -5,7 +5,7 @@
     <p:sldMasterId id="2147483761" r:id="rId1"/>
   </p:sldMasterIdLst>
   <p:notesMasterIdLst>
-    <p:notesMasterId r:id="rId15"/>
+    <p:notesMasterId r:id="rId17"/>
   </p:notesMasterIdLst>
   <p:sldIdLst>
     <p:sldId id="256" r:id="rId2"/>
@@ -19,8 +19,10 @@
     <p:sldId id="268" r:id="rId10"/>
     <p:sldId id="263" r:id="rId11"/>
     <p:sldId id="265" r:id="rId12"/>
-    <p:sldId id="266" r:id="rId13"/>
-    <p:sldId id="267" r:id="rId14"/>
+    <p:sldId id="269" r:id="rId13"/>
+    <p:sldId id="266" r:id="rId14"/>
+    <p:sldId id="270" r:id="rId15"/>
+    <p:sldId id="267" r:id="rId16"/>
   </p:sldIdLst>
   <p:sldSz cx="12192000" cy="6858000"/>
   <p:notesSz cx="6858000" cy="9144000"/>
@@ -129,7 +131,7 @@
 
 <file path=ppt/commentAuthors.xml><?xml version="1.0" encoding="utf-8"?>
 <p:cmAuthorLst xmlns:a="http://schemas.openxmlformats.org/drawingml/2006/main" xmlns:r="http://schemas.openxmlformats.org/officeDocument/2006/relationships" xmlns:p="http://schemas.openxmlformats.org/presentationml/2006/main">
-  <p:cmAuthor id="1" name="Koh Yi Da" initials="KYD" lastIdx="2" clrIdx="0">
+  <p:cmAuthor id="1" name="Koh Yi Da" initials="KYD" lastIdx="3" clrIdx="0">
     <p:extLst>
       <p:ext uri="{19B8F6BF-5375-455C-9EA6-DF929625EA0E}">
         <p15:presenceInfo xmlns:p15="http://schemas.microsoft.com/office/powerpoint/2012/main" userId="Koh Yi Da" providerId="None"/>
@@ -7386,6 +7388,308 @@
           <p:cNvPr id="7" name="Group 6">
             <a:extLst>
               <a:ext uri="{FF2B5EF4-FFF2-40B4-BE49-F238E27FC236}">
+                <a16:creationId xmlns:a16="http://schemas.microsoft.com/office/drawing/2014/main" id="{76C34087-C1EC-483A-AD8C-7DFC24A78AB4}"/>
+              </a:ext>
+            </a:extLst>
+          </p:cNvPr>
+          <p:cNvGrpSpPr/>
+          <p:nvPr/>
+        </p:nvGrpSpPr>
+        <p:grpSpPr>
+          <a:xfrm>
+            <a:off x="1036320" y="1097280"/>
+            <a:ext cx="10304124" cy="2051273"/>
+            <a:chOff x="1036320" y="1097280"/>
+            <a:chExt cx="10304124" cy="2051273"/>
+          </a:xfrm>
+        </p:grpSpPr>
+        <p:pic>
+          <p:nvPicPr>
+            <p:cNvPr id="4" name="Picture 3">
+              <a:extLst>
+                <a:ext uri="{FF2B5EF4-FFF2-40B4-BE49-F238E27FC236}">
+                  <a16:creationId xmlns:a16="http://schemas.microsoft.com/office/drawing/2014/main" id="{4652FA42-8469-4AA7-B8A9-DBA3BB1A6E58}"/>
+                </a:ext>
+              </a:extLst>
+            </p:cNvPr>
+            <p:cNvPicPr>
+              <a:picLocks noChangeAspect="1"/>
+            </p:cNvPicPr>
+            <p:nvPr/>
+          </p:nvPicPr>
+          <p:blipFill rotWithShape="1">
+            <a:blip r:embed="rId2"/>
+            <a:srcRect l="8501" t="16000" r="6984" b="54090"/>
+            <a:stretch/>
+          </p:blipFill>
+          <p:spPr>
+            <a:xfrm>
+              <a:off x="1036320" y="1097280"/>
+              <a:ext cx="10304124" cy="2051273"/>
+            </a:xfrm>
+            <a:prstGeom prst="rect">
+              <a:avLst/>
+            </a:prstGeom>
+            <a:ln>
+              <a:noFill/>
+            </a:ln>
+            <a:effectLst>
+              <a:outerShdw blurRad="190500" algn="tl" rotWithShape="0">
+                <a:srgbClr val="000000">
+                  <a:alpha val="70000"/>
+                </a:srgbClr>
+              </a:outerShdw>
+            </a:effectLst>
+          </p:spPr>
+        </p:pic>
+        <p:sp>
+          <p:nvSpPr>
+            <p:cNvPr id="5" name="Rectangle: Rounded Corners 4">
+              <a:extLst>
+                <a:ext uri="{FF2B5EF4-FFF2-40B4-BE49-F238E27FC236}">
+                  <a16:creationId xmlns:a16="http://schemas.microsoft.com/office/drawing/2014/main" id="{2BEC4771-965F-490A-A8C3-8B6CDAE7F9D0}"/>
+                </a:ext>
+              </a:extLst>
+            </p:cNvPr>
+            <p:cNvSpPr/>
+            <p:nvPr/>
+          </p:nvSpPr>
+          <p:spPr>
+            <a:xfrm>
+              <a:off x="5114982" y="1221482"/>
+              <a:ext cx="6187440" cy="407158"/>
+            </a:xfrm>
+            <a:prstGeom prst="roundRect">
+              <a:avLst/>
+            </a:prstGeom>
+            <a:noFill/>
+            <a:ln w="19050">
+              <a:solidFill>
+                <a:srgbClr val="FF0000"/>
+              </a:solidFill>
+              <a:prstDash val="sysDash"/>
+            </a:ln>
+          </p:spPr>
+          <p:style>
+            <a:lnRef idx="2">
+              <a:schemeClr val="accent1">
+                <a:shade val="50000"/>
+              </a:schemeClr>
+            </a:lnRef>
+            <a:fillRef idx="1">
+              <a:schemeClr val="accent1"/>
+            </a:fillRef>
+            <a:effectRef idx="0">
+              <a:schemeClr val="accent1"/>
+            </a:effectRef>
+            <a:fontRef idx="minor">
+              <a:schemeClr val="lt1"/>
+            </a:fontRef>
+          </p:style>
+          <p:txBody>
+            <a:bodyPr rtlCol="0" anchor="ctr"/>
+            <a:lstStyle/>
+            <a:p>
+              <a:pPr algn="ctr"/>
+              <a:endParaRPr lang="en-SG" dirty="0"/>
+            </a:p>
+          </p:txBody>
+        </p:sp>
+        <p:sp>
+          <p:nvSpPr>
+            <p:cNvPr id="6" name="Rectangle: Rounded Corners 5">
+              <a:extLst>
+                <a:ext uri="{FF2B5EF4-FFF2-40B4-BE49-F238E27FC236}">
+                  <a16:creationId xmlns:a16="http://schemas.microsoft.com/office/drawing/2014/main" id="{A99B55AA-CD1A-4FE4-AB6B-E14C807D2E9A}"/>
+                </a:ext>
+              </a:extLst>
+            </p:cNvPr>
+            <p:cNvSpPr/>
+            <p:nvPr/>
+          </p:nvSpPr>
+          <p:spPr>
+            <a:xfrm>
+              <a:off x="9043178" y="1560582"/>
+              <a:ext cx="2259244" cy="429767"/>
+            </a:xfrm>
+            <a:prstGeom prst="roundRect">
+              <a:avLst/>
+            </a:prstGeom>
+            <a:gradFill flip="none" rotWithShape="1">
+              <a:gsLst>
+                <a:gs pos="0">
+                  <a:srgbClr val="F86262">
+                    <a:tint val="66000"/>
+                    <a:satMod val="160000"/>
+                  </a:srgbClr>
+                </a:gs>
+                <a:gs pos="50000">
+                  <a:srgbClr val="F86262">
+                    <a:tint val="44500"/>
+                    <a:satMod val="160000"/>
+                  </a:srgbClr>
+                </a:gs>
+                <a:gs pos="100000">
+                  <a:srgbClr val="F86262">
+                    <a:tint val="23500"/>
+                    <a:satMod val="160000"/>
+                  </a:srgbClr>
+                </a:gs>
+              </a:gsLst>
+              <a:path path="circle">
+                <a:fillToRect l="50000" t="50000" r="50000" b="50000"/>
+              </a:path>
+              <a:tileRect/>
+            </a:gradFill>
+            <a:ln>
+              <a:solidFill>
+                <a:srgbClr val="FF0000"/>
+              </a:solidFill>
+            </a:ln>
+          </p:spPr>
+          <p:style>
+            <a:lnRef idx="2">
+              <a:schemeClr val="accent1">
+                <a:shade val="50000"/>
+              </a:schemeClr>
+            </a:lnRef>
+            <a:fillRef idx="1">
+              <a:schemeClr val="accent1"/>
+            </a:fillRef>
+            <a:effectRef idx="0">
+              <a:schemeClr val="accent1"/>
+            </a:effectRef>
+            <a:fontRef idx="minor">
+              <a:schemeClr val="lt1"/>
+            </a:fontRef>
+          </p:style>
+          <p:txBody>
+            <a:bodyPr rtlCol="0" anchor="ctr"/>
+            <a:lstStyle/>
+            <a:p>
+              <a:pPr algn="ctr"/>
+              <a:r>
+                <a:rPr lang="en-SG" sz="1600" dirty="0">
+                  <a:solidFill>
+                    <a:schemeClr val="tx1"/>
+                  </a:solidFill>
+                  <a:effectLst>
+                    <a:outerShdw blurRad="38100" dist="38100" dir="2700000" algn="tl">
+                      <a:srgbClr val="000000">
+                        <a:alpha val="43137"/>
+                      </a:srgbClr>
+                    </a:outerShdw>
+                  </a:effectLst>
+                  <a:latin typeface="Bahnschrift Light Condensed" panose="020B0502040204020203" pitchFamily="34" charset="0"/>
+                </a:rPr>
+                <a:t>T</a:t>
+              </a:r>
+              <a:r>
+                <a:rPr lang="en-SG" sz="1600" b="1" dirty="0">
+                  <a:solidFill>
+                    <a:schemeClr val="tx1"/>
+                  </a:solidFill>
+                  <a:effectLst>
+                    <a:outerShdw blurRad="38100" dist="38100" dir="2700000" algn="tl">
+                      <a:srgbClr val="000000">
+                        <a:alpha val="43137"/>
+                      </a:srgbClr>
+                    </a:outerShdw>
+                  </a:effectLst>
+                  <a:latin typeface="Bahnschrift Light Condensed" panose="020B0502040204020203" pitchFamily="34" charset="0"/>
+                </a:rPr>
+                <a:t>imer</a:t>
+              </a:r>
+              <a:r>
+                <a:rPr lang="en-SG" sz="1600" dirty="0">
+                  <a:solidFill>
+                    <a:schemeClr val="tx1"/>
+                  </a:solidFill>
+                  <a:effectLst>
+                    <a:outerShdw blurRad="38100" dist="38100" dir="2700000" algn="tl">
+                      <a:srgbClr val="000000">
+                        <a:alpha val="43137"/>
+                      </a:srgbClr>
+                    </a:outerShdw>
+                  </a:effectLst>
+                  <a:latin typeface="Bahnschrift Light Condensed" panose="020B0502040204020203" pitchFamily="34" charset="0"/>
+                </a:rPr>
+                <a:t> feature that </a:t>
+              </a:r>
+            </a:p>
+            <a:p>
+              <a:pPr algn="ctr"/>
+              <a:r>
+                <a:rPr lang="en-SG" sz="1600" dirty="0">
+                  <a:solidFill>
+                    <a:schemeClr val="tx1"/>
+                  </a:solidFill>
+                  <a:effectLst>
+                    <a:outerShdw blurRad="38100" dist="38100" dir="2700000" algn="tl">
+                      <a:srgbClr val="000000">
+                        <a:alpha val="43137"/>
+                      </a:srgbClr>
+                    </a:outerShdw>
+                  </a:effectLst>
+                  <a:latin typeface="Bahnschrift Light Condensed" panose="020B0502040204020203" pitchFamily="34" charset="0"/>
+                </a:rPr>
+                <a:t>updates in </a:t>
+              </a:r>
+              <a:r>
+                <a:rPr lang="en-SG" sz="1600" i="1" dirty="0">
+                  <a:solidFill>
+                    <a:schemeClr val="tx1"/>
+                  </a:solidFill>
+                  <a:effectLst>
+                    <a:outerShdw blurRad="38100" dist="38100" dir="2700000" algn="tl">
+                      <a:srgbClr val="000000">
+                        <a:alpha val="43137"/>
+                      </a:srgbClr>
+                    </a:outerShdw>
+                  </a:effectLst>
+                  <a:latin typeface="Bahnschrift Light Condensed" panose="020B0502040204020203" pitchFamily="34" charset="0"/>
+                </a:rPr>
+                <a:t>Real Time</a:t>
+              </a:r>
+            </a:p>
+          </p:txBody>
+        </p:sp>
+      </p:grpSp>
+    </p:spTree>
+    <p:extLst>
+      <p:ext uri="{BB962C8B-B14F-4D97-AF65-F5344CB8AC3E}">
+        <p14:creationId xmlns:p14="http://schemas.microsoft.com/office/powerpoint/2010/main" val="2605434200"/>
+      </p:ext>
+    </p:extLst>
+  </p:cSld>
+  <p:clrMapOvr>
+    <a:masterClrMapping/>
+  </p:clrMapOvr>
+</p:sld>
+</file>
+
+<file path=ppt/slides/slide13.xml><?xml version="1.0" encoding="utf-8"?>
+<p:sld xmlns:a="http://schemas.openxmlformats.org/drawingml/2006/main" xmlns:r="http://schemas.openxmlformats.org/officeDocument/2006/relationships" xmlns:p="http://schemas.openxmlformats.org/presentationml/2006/main">
+  <p:cSld>
+    <p:spTree>
+      <p:nvGrpSpPr>
+        <p:cNvPr id="1" name=""/>
+        <p:cNvGrpSpPr/>
+        <p:nvPr/>
+      </p:nvGrpSpPr>
+      <p:grpSpPr>
+        <a:xfrm>
+          <a:off x="0" y="0"/>
+          <a:ext cx="0" cy="0"/>
+          <a:chOff x="0" y="0"/>
+          <a:chExt cx="0" cy="0"/>
+        </a:xfrm>
+      </p:grpSpPr>
+      <p:grpSp>
+        <p:nvGrpSpPr>
+          <p:cNvPr id="7" name="Group 6">
+            <a:extLst>
+              <a:ext uri="{FF2B5EF4-FFF2-40B4-BE49-F238E27FC236}">
                 <a16:creationId xmlns:a16="http://schemas.microsoft.com/office/drawing/2014/main" id="{83E07877-31B2-476F-B078-A42865DDD790}"/>
               </a:ext>
             </a:extLst>
@@ -7644,7 +7948,287 @@
 </p:sld>
 </file>
 
-<file path=ppt/slides/slide13.xml><?xml version="1.0" encoding="utf-8"?>
+<file path=ppt/slides/slide14.xml><?xml version="1.0" encoding="utf-8"?>
+<p:sld xmlns:a="http://schemas.openxmlformats.org/drawingml/2006/main" xmlns:r="http://schemas.openxmlformats.org/officeDocument/2006/relationships" xmlns:p="http://schemas.openxmlformats.org/presentationml/2006/main">
+  <p:cSld>
+    <p:spTree>
+      <p:nvGrpSpPr>
+        <p:cNvPr id="1" name=""/>
+        <p:cNvGrpSpPr/>
+        <p:nvPr/>
+      </p:nvGrpSpPr>
+      <p:grpSpPr>
+        <a:xfrm>
+          <a:off x="0" y="0"/>
+          <a:ext cx="0" cy="0"/>
+          <a:chOff x="0" y="0"/>
+          <a:chExt cx="0" cy="0"/>
+        </a:xfrm>
+      </p:grpSpPr>
+      <p:grpSp>
+        <p:nvGrpSpPr>
+          <p:cNvPr id="7" name="Group 6">
+            <a:extLst>
+              <a:ext uri="{FF2B5EF4-FFF2-40B4-BE49-F238E27FC236}">
+                <a16:creationId xmlns:a16="http://schemas.microsoft.com/office/drawing/2014/main" id="{AC976449-C7AE-4C66-B961-649B93A11F9E}"/>
+              </a:ext>
+            </a:extLst>
+          </p:cNvPr>
+          <p:cNvGrpSpPr/>
+          <p:nvPr/>
+        </p:nvGrpSpPr>
+        <p:grpSpPr>
+          <a:xfrm>
+            <a:off x="1059364" y="1112363"/>
+            <a:ext cx="10262229" cy="4958499"/>
+            <a:chOff x="1059364" y="1112363"/>
+            <a:chExt cx="10262229" cy="4958499"/>
+          </a:xfrm>
+        </p:grpSpPr>
+        <p:pic>
+          <p:nvPicPr>
+            <p:cNvPr id="4" name="Picture 3">
+              <a:extLst>
+                <a:ext uri="{FF2B5EF4-FFF2-40B4-BE49-F238E27FC236}">
+                  <a16:creationId xmlns:a16="http://schemas.microsoft.com/office/drawing/2014/main" id="{3FB2CD67-6C84-4686-8E2B-2A1DC5B6B9EC}"/>
+                </a:ext>
+              </a:extLst>
+            </p:cNvPr>
+            <p:cNvPicPr>
+              <a:picLocks noChangeAspect="1"/>
+            </p:cNvPicPr>
+            <p:nvPr/>
+          </p:nvPicPr>
+          <p:blipFill rotWithShape="1">
+            <a:blip r:embed="rId2"/>
+            <a:srcRect l="8689" t="16219" r="7140" b="11478"/>
+            <a:stretch/>
+          </p:blipFill>
+          <p:spPr>
+            <a:xfrm>
+              <a:off x="1059365" y="1112363"/>
+              <a:ext cx="10262228" cy="4958499"/>
+            </a:xfrm>
+            <a:prstGeom prst="rect">
+              <a:avLst/>
+            </a:prstGeom>
+            <a:ln>
+              <a:noFill/>
+            </a:ln>
+            <a:effectLst>
+              <a:outerShdw blurRad="190500" algn="tl" rotWithShape="0">
+                <a:srgbClr val="000000">
+                  <a:alpha val="70000"/>
+                </a:srgbClr>
+              </a:outerShdw>
+            </a:effectLst>
+          </p:spPr>
+        </p:pic>
+        <p:sp>
+          <p:nvSpPr>
+            <p:cNvPr id="5" name="Rectangle: Rounded Corners 4">
+              <a:extLst>
+                <a:ext uri="{FF2B5EF4-FFF2-40B4-BE49-F238E27FC236}">
+                  <a16:creationId xmlns:a16="http://schemas.microsoft.com/office/drawing/2014/main" id="{63B41522-BF90-4AC8-AE0D-D6C2E396B218}"/>
+                </a:ext>
+              </a:extLst>
+            </p:cNvPr>
+            <p:cNvSpPr/>
+            <p:nvPr/>
+          </p:nvSpPr>
+          <p:spPr>
+            <a:xfrm>
+              <a:off x="1059364" y="4554593"/>
+              <a:ext cx="10239813" cy="1450757"/>
+            </a:xfrm>
+            <a:prstGeom prst="roundRect">
+              <a:avLst/>
+            </a:prstGeom>
+            <a:noFill/>
+            <a:ln w="19050">
+              <a:solidFill>
+                <a:srgbClr val="FFFF00"/>
+              </a:solidFill>
+              <a:prstDash val="sysDash"/>
+            </a:ln>
+          </p:spPr>
+          <p:style>
+            <a:lnRef idx="2">
+              <a:schemeClr val="accent1">
+                <a:shade val="50000"/>
+              </a:schemeClr>
+            </a:lnRef>
+            <a:fillRef idx="1">
+              <a:schemeClr val="accent1"/>
+            </a:fillRef>
+            <a:effectRef idx="0">
+              <a:schemeClr val="accent1"/>
+            </a:effectRef>
+            <a:fontRef idx="minor">
+              <a:schemeClr val="lt1"/>
+            </a:fontRef>
+          </p:style>
+          <p:txBody>
+            <a:bodyPr rtlCol="0" anchor="ctr"/>
+            <a:lstStyle/>
+            <a:p>
+              <a:pPr algn="ctr"/>
+              <a:endParaRPr lang="en-SG" dirty="0"/>
+            </a:p>
+          </p:txBody>
+        </p:sp>
+        <p:sp>
+          <p:nvSpPr>
+            <p:cNvPr id="6" name="Rectangle: Rounded Corners 5">
+              <a:extLst>
+                <a:ext uri="{FF2B5EF4-FFF2-40B4-BE49-F238E27FC236}">
+                  <a16:creationId xmlns:a16="http://schemas.microsoft.com/office/drawing/2014/main" id="{BFB0C5FA-FA1E-45D5-AAB1-E9CBC39380AA}"/>
+                </a:ext>
+              </a:extLst>
+            </p:cNvPr>
+            <p:cNvSpPr/>
+            <p:nvPr/>
+          </p:nvSpPr>
+          <p:spPr>
+            <a:xfrm>
+              <a:off x="7393974" y="4275680"/>
+              <a:ext cx="3300075" cy="482410"/>
+            </a:xfrm>
+            <a:prstGeom prst="roundRect">
+              <a:avLst/>
+            </a:prstGeom>
+            <a:gradFill flip="none" rotWithShape="1">
+              <a:gsLst>
+                <a:gs pos="0">
+                  <a:srgbClr val="FFFF00">
+                    <a:tint val="66000"/>
+                    <a:satMod val="160000"/>
+                  </a:srgbClr>
+                </a:gs>
+                <a:gs pos="50000">
+                  <a:srgbClr val="FFFF00">
+                    <a:tint val="44500"/>
+                    <a:satMod val="160000"/>
+                  </a:srgbClr>
+                </a:gs>
+                <a:gs pos="100000">
+                  <a:srgbClr val="FFFF00">
+                    <a:tint val="23500"/>
+                    <a:satMod val="160000"/>
+                  </a:srgbClr>
+                </a:gs>
+              </a:gsLst>
+              <a:lin ang="10800000" scaled="1"/>
+              <a:tileRect/>
+            </a:gradFill>
+            <a:ln w="19050">
+              <a:solidFill>
+                <a:schemeClr val="accent2">
+                  <a:lumMod val="75000"/>
+                </a:schemeClr>
+              </a:solidFill>
+            </a:ln>
+          </p:spPr>
+          <p:style>
+            <a:lnRef idx="2">
+              <a:schemeClr val="accent1">
+                <a:shade val="50000"/>
+              </a:schemeClr>
+            </a:lnRef>
+            <a:fillRef idx="1">
+              <a:schemeClr val="accent1"/>
+            </a:fillRef>
+            <a:effectRef idx="0">
+              <a:schemeClr val="accent1"/>
+            </a:effectRef>
+            <a:fontRef idx="minor">
+              <a:schemeClr val="lt1"/>
+            </a:fontRef>
+          </p:style>
+          <p:txBody>
+            <a:bodyPr rtlCol="0" anchor="ctr"/>
+            <a:lstStyle/>
+            <a:p>
+              <a:pPr algn="ctr"/>
+              <a:r>
+                <a:rPr lang="en-SG" sz="2100" i="1" dirty="0">
+                  <a:solidFill>
+                    <a:schemeClr val="tx1"/>
+                  </a:solidFill>
+                  <a:effectLst>
+                    <a:outerShdw blurRad="38100" dist="38100" dir="2700000" algn="tl">
+                      <a:srgbClr val="000000">
+                        <a:alpha val="43137"/>
+                      </a:srgbClr>
+                    </a:outerShdw>
+                  </a:effectLst>
+                  <a:latin typeface="Bahnschrift Light Condensed" panose="020B0502040204020203" pitchFamily="34" charset="0"/>
+                </a:rPr>
+                <a:t>Automated</a:t>
+              </a:r>
+              <a:r>
+                <a:rPr lang="en-SG" sz="2100" dirty="0">
+                  <a:solidFill>
+                    <a:schemeClr val="tx1"/>
+                  </a:solidFill>
+                  <a:effectLst>
+                    <a:outerShdw blurRad="38100" dist="38100" dir="2700000" algn="tl">
+                      <a:srgbClr val="000000">
+                        <a:alpha val="43137"/>
+                      </a:srgbClr>
+                    </a:outerShdw>
+                  </a:effectLst>
+                  <a:latin typeface="Bahnschrift Light Condensed" panose="020B0502040204020203" pitchFamily="34" charset="0"/>
+                </a:rPr>
+                <a:t>  Hangman-style </a:t>
+              </a:r>
+              <a:r>
+                <a:rPr lang="en-SG" sz="2100" b="1" dirty="0">
+                  <a:solidFill>
+                    <a:schemeClr val="tx1"/>
+                  </a:solidFill>
+                  <a:effectLst>
+                    <a:outerShdw blurRad="38100" dist="38100" dir="2700000" algn="tl">
+                      <a:srgbClr val="000000">
+                        <a:alpha val="43137"/>
+                      </a:srgbClr>
+                    </a:outerShdw>
+                  </a:effectLst>
+                  <a:latin typeface="Bahnschrift Light Condensed" panose="020B0502040204020203" pitchFamily="34" charset="0"/>
+                </a:rPr>
+                <a:t>Hints</a:t>
+              </a:r>
+              <a:endParaRPr lang="en-SG" sz="2100" dirty="0">
+                <a:solidFill>
+                  <a:schemeClr val="tx1"/>
+                </a:solidFill>
+                <a:effectLst>
+                  <a:outerShdw blurRad="38100" dist="38100" dir="2700000" algn="tl">
+                    <a:srgbClr val="000000">
+                      <a:alpha val="43137"/>
+                    </a:srgbClr>
+                  </a:outerShdw>
+                </a:effectLst>
+                <a:latin typeface="Bahnschrift Light Condensed" panose="020B0502040204020203" pitchFamily="34" charset="0"/>
+              </a:endParaRPr>
+            </a:p>
+          </p:txBody>
+        </p:sp>
+      </p:grpSp>
+    </p:spTree>
+    <p:extLst>
+      <p:ext uri="{BB962C8B-B14F-4D97-AF65-F5344CB8AC3E}">
+        <p14:creationId xmlns:p14="http://schemas.microsoft.com/office/powerpoint/2010/main" val="2528560895"/>
+      </p:ext>
+    </p:extLst>
+  </p:cSld>
+  <p:clrMapOvr>
+    <a:masterClrMapping/>
+  </p:clrMapOvr>
+</p:sld>
+</file>
+
+<file path=ppt/slides/slide15.xml><?xml version="1.0" encoding="utf-8"?>
 <p:sld xmlns:a="http://schemas.openxmlformats.org/drawingml/2006/main" xmlns:r="http://schemas.openxmlformats.org/officeDocument/2006/relationships" xmlns:p="http://schemas.openxmlformats.org/presentationml/2006/main">
   <p:cSld>
     <p:spTree>

</xml_diff>